<commit_message>
added repo link in ppt
</commit_message>
<xml_diff>
--- a/Test Driven Development(tdd).pptx
+++ b/Test Driven Development(tdd).pptx
@@ -7000,12 +7000,6 @@
               </a:rPr>
               <a:t> </a:t>
             </a:r>
-            <a:endParaRPr lang="en-US" sz="3600" dirty="0" smtClean="0">
-              <a:solidFill>
-                <a:schemeClr val="bg1"/>
-              </a:solidFill>
-              <a:latin typeface="Comic Sans MS" pitchFamily="66" charset="0"/>
-            </a:endParaRPr>
           </a:p>
         </p:txBody>
       </p:sp>
@@ -8085,8 +8079,8 @@
         </p:nvSpPr>
         <p:spPr>
           <a:xfrm>
-            <a:off x="304800" y="1752600"/>
-            <a:ext cx="8382000" cy="5693866"/>
+            <a:off x="304800" y="1371601"/>
+            <a:ext cx="8458200" cy="3539430"/>
           </a:xfrm>
           <a:prstGeom prst="rect">
             <a:avLst/>
@@ -8163,10 +8157,8 @@
                 </a:solidFill>
                 <a:latin typeface="Comic Sans MS" pitchFamily="66" charset="0"/>
               </a:rPr>
-              <a:t>All the content will on this repo</a:t>
-            </a:r>
-          </a:p>
-          <a:p>
+              <a:t>All the content will on this </a:t>
+            </a:r>
             <a:r>
               <a:rPr lang="en-US" sz="3200" dirty="0" smtClean="0">
                 <a:solidFill>
@@ -8174,50 +8166,70 @@
                 </a:solidFill>
                 <a:latin typeface="Comic Sans MS" pitchFamily="66" charset="0"/>
               </a:rPr>
-              <a:t>	http://www.github.com</a:t>
-            </a:r>
-            <a:br>
-              <a:rPr lang="en-US" sz="3200" dirty="0" smtClean="0">
+              <a:t>repo</a:t>
+            </a:r>
+          </a:p>
+        </p:txBody>
+      </p:sp>
+      <p:sp>
+        <p:nvSpPr>
+          <p:cNvPr id="5" name="TextBox 4"/>
+          <p:cNvSpPr txBox="1"/>
+          <p:nvPr/>
+        </p:nvSpPr>
+        <p:spPr>
+          <a:xfrm>
+            <a:off x="533400" y="5257800"/>
+            <a:ext cx="5638800" cy="369332"/>
+          </a:xfrm>
+          <a:prstGeom prst="rect">
+            <a:avLst/>
+          </a:prstGeom>
+          <a:solidFill>
+            <a:srgbClr val="7030A0"/>
+          </a:solidFill>
+          <a:ln>
+            <a:noFill/>
+          </a:ln>
+          <a:effectLst>
+            <a:outerShdw blurRad="44450" dist="27940" dir="5400000" algn="ctr">
+              <a:srgbClr val="000000">
+                <a:alpha val="32000"/>
+              </a:srgbClr>
+            </a:outerShdw>
+          </a:effectLst>
+          <a:scene3d>
+            <a:camera prst="orthographicFront">
+              <a:rot lat="0" lon="0" rev="0"/>
+            </a:camera>
+            <a:lightRig rig="balanced" dir="t">
+              <a:rot lat="0" lon="0" rev="8700000"/>
+            </a:lightRig>
+          </a:scene3d>
+          <a:sp3d>
+            <a:bevelT w="190500" h="38100"/>
+          </a:sp3d>
+        </p:spPr>
+        <p:txBody>
+          <a:bodyPr wrap="square" rtlCol="0">
+            <a:spAutoFit/>
+          </a:bodyPr>
+          <a:lstStyle/>
+          <a:p>
+            <a:r>
+              <a:rPr lang="en-US" b="1" i="1" dirty="0" smtClean="0">
                 <a:solidFill>
                   <a:schemeClr val="bg1"/>
                 </a:solidFill>
                 <a:latin typeface="Comic Sans MS" pitchFamily="66" charset="0"/>
-              </a:rPr>
-            </a:br>
-            <a:r>
-              <a:rPr lang="en-US" sz="3600" dirty="0" smtClean="0">
-                <a:solidFill>
-                  <a:schemeClr val="bg1"/>
-                </a:solidFill>
-                <a:latin typeface="Comic Sans MS" pitchFamily="66" charset="0"/>
-              </a:rPr>
-              <a:t/>
-            </a:r>
-            <a:br>
-              <a:rPr lang="en-US" sz="3600" dirty="0" smtClean="0">
-                <a:solidFill>
-                  <a:schemeClr val="bg1"/>
-                </a:solidFill>
-                <a:latin typeface="Comic Sans MS" pitchFamily="66" charset="0"/>
-              </a:rPr>
-            </a:br>
-            <a:endParaRPr lang="en-US" sz="3600" dirty="0" smtClean="0">
+                <a:hlinkClick r:id="rId2"/>
+              </a:rPr>
+              <a:t>https://github.com/MufassirShaw/presentation</a:t>
+            </a:r>
+            <a:endParaRPr lang="en-US" dirty="0">
               <a:solidFill>
                 <a:schemeClr val="bg1"/>
               </a:solidFill>
-              <a:latin typeface="Comic Sans MS" pitchFamily="66" charset="0"/>
-            </a:endParaRPr>
-          </a:p>
-          <a:p>
-            <a:pPr>
-              <a:buFont typeface="Arial" pitchFamily="34" charset="0"/>
-              <a:buChar char="•"/>
-            </a:pPr>
-            <a:endParaRPr lang="en-US" sz="3600" dirty="0">
-              <a:solidFill>
-                <a:schemeClr val="bg1"/>
-              </a:solidFill>
-              <a:latin typeface="Comic Sans MS" pitchFamily="66" charset="0"/>
             </a:endParaRPr>
           </a:p>
         </p:txBody>
@@ -9063,34 +9075,7 @@
                 </a:solidFill>
                 <a:latin typeface="Comic Sans MS" pitchFamily="66" charset="0"/>
               </a:rPr>
-              <a:t>Failing Test(s) </a:t>
-            </a:r>
-            <a:r>
-              <a:rPr lang="en-US" sz="2800" b="1" dirty="0" smtClean="0">
-                <a:solidFill>
-                  <a:schemeClr val="bg1"/>
-                </a:solidFill>
-                <a:latin typeface="Comic Sans MS" pitchFamily="66" charset="0"/>
-              </a:rPr>
-              <a:t>for </a:t>
-            </a:r>
-            <a:r>
-              <a:rPr lang="en-US" sz="2800" b="1" dirty="0" smtClean="0">
-                <a:solidFill>
-                  <a:schemeClr val="bg1"/>
-                </a:solidFill>
-                <a:latin typeface="Comic Sans MS" pitchFamily="66" charset="0"/>
-              </a:rPr>
-              <a:t>a feature is </a:t>
-            </a:r>
-            <a:r>
-              <a:rPr lang="en-US" sz="2800" b="1" dirty="0" smtClean="0">
-                <a:solidFill>
-                  <a:schemeClr val="bg1"/>
-                </a:solidFill>
-                <a:latin typeface="Comic Sans MS" pitchFamily="66" charset="0"/>
-              </a:rPr>
-              <a:t>written prior to its implementation.</a:t>
+              <a:t>Failing Test(s) for a feature is written prior to its implementation.</a:t>
             </a:r>
           </a:p>
           <a:p>

</xml_diff>